<commit_message>
Update link to repository in slides.
</commit_message>
<xml_diff>
--- a/Slides/QLS-MiCM Intro to Python (Part 1) Workshop PPT - April.pptx
+++ b/Slides/QLS-MiCM Intro to Python (Part 1) Workshop PPT - April.pptx
@@ -9920,7 +9920,7 @@
           <a:p>
             <a:fld id="{9FF74AA5-8A3E-4FDB-94BB-BF4B31CB4E38}" type="datetimeFigureOut">
               <a:rPr lang="en-CA" smtClean="0"/>
-              <a:t>2025-04-15</a:t>
+              <a:t>2025-04-17</a:t>
             </a:fld>
             <a:endParaRPr lang="en-CA"/>
           </a:p>
@@ -10097,7 +10097,7 @@
           <a:p>
             <a:fld id="{217E5156-1B5D-054E-B5B2-E1B1BA160252}" type="datetimeFigureOut">
               <a:rPr lang="fr-FR" smtClean="0"/>
-              <a:t>15/04/2025</a:t>
+              <a:t>17/04/2025</a:t>
             </a:fld>
             <a:endParaRPr lang="fr-FR"/>
           </a:p>

</xml_diff>